<commit_message>
New RealtimePage layout and some screen navigation fixes.
</commit_message>
<xml_diff>
--- a/Design/Midi Mapper v2.pptx
+++ b/Design/Midi Mapper v2.pptx
@@ -165,10 +165,9 @@
           <a:lstStyle/>
           <a:p>
             <a:r>
-              <a:rPr lang="en-US" smtClean="0"/>
+              <a:rPr lang="en-US"/>
               <a:t>Click to edit Master title style</a:t>
             </a:r>
-            <a:endParaRPr lang="en-US"/>
           </a:p>
         </p:txBody>
       </p:sp>
@@ -284,10 +283,9 @@
           </a:lstStyle>
           <a:p>
             <a:r>
-              <a:rPr lang="en-US" smtClean="0"/>
+              <a:rPr lang="en-US"/>
               <a:t>Click to edit Master subtitle style</a:t>
             </a:r>
-            <a:endParaRPr lang="en-US"/>
           </a:p>
         </p:txBody>
       </p:sp>
@@ -309,7 +307,7 @@
             <a:fld id="{D431C736-B0D3-41FF-8BF2-1A12F2835DC3}" type="datetimeFigureOut">
               <a:rPr lang="en-US" smtClean="0"/>
               <a:pPr/>
-              <a:t>10/23/2015</a:t>
+              <a:t>3/12/2017</a:t>
             </a:fld>
             <a:endParaRPr lang="en-US"/>
           </a:p>
@@ -399,10 +397,9 @@
           <a:lstStyle/>
           <a:p>
             <a:r>
-              <a:rPr lang="en-US" smtClean="0"/>
+              <a:rPr lang="en-US"/>
               <a:t>Click to edit Master title style</a:t>
             </a:r>
-            <a:endParaRPr lang="en-US"/>
           </a:p>
         </p:txBody>
       </p:sp>
@@ -423,38 +420,37 @@
           <a:p>
             <a:pPr lvl="0"/>
             <a:r>
-              <a:rPr lang="en-US" smtClean="0"/>
+              <a:rPr lang="en-US"/>
               <a:t>Click to edit Master text styles</a:t>
             </a:r>
           </a:p>
           <a:p>
             <a:pPr lvl="1"/>
             <a:r>
-              <a:rPr lang="en-US" smtClean="0"/>
+              <a:rPr lang="en-US"/>
               <a:t>Second level</a:t>
             </a:r>
           </a:p>
           <a:p>
             <a:pPr lvl="2"/>
             <a:r>
-              <a:rPr lang="en-US" smtClean="0"/>
+              <a:rPr lang="en-US"/>
               <a:t>Third level</a:t>
             </a:r>
           </a:p>
           <a:p>
             <a:pPr lvl="3"/>
             <a:r>
-              <a:rPr lang="en-US" smtClean="0"/>
+              <a:rPr lang="en-US"/>
               <a:t>Fourth level</a:t>
             </a:r>
           </a:p>
           <a:p>
             <a:pPr lvl="4"/>
             <a:r>
-              <a:rPr lang="en-US" smtClean="0"/>
+              <a:rPr lang="en-US"/>
               <a:t>Fifth level</a:t>
             </a:r>
-            <a:endParaRPr lang="en-US"/>
           </a:p>
         </p:txBody>
       </p:sp>
@@ -476,7 +472,7 @@
             <a:fld id="{D431C736-B0D3-41FF-8BF2-1A12F2835DC3}" type="datetimeFigureOut">
               <a:rPr lang="en-US" smtClean="0"/>
               <a:pPr/>
-              <a:t>10/23/2015</a:t>
+              <a:t>3/12/2017</a:t>
             </a:fld>
             <a:endParaRPr lang="en-US"/>
           </a:p>
@@ -571,10 +567,9 @@
           <a:lstStyle/>
           <a:p>
             <a:r>
-              <a:rPr lang="en-US" smtClean="0"/>
+              <a:rPr lang="en-US"/>
               <a:t>Click to edit Master title style</a:t>
             </a:r>
-            <a:endParaRPr lang="en-US"/>
           </a:p>
         </p:txBody>
       </p:sp>
@@ -600,38 +595,37 @@
           <a:p>
             <a:pPr lvl="0"/>
             <a:r>
-              <a:rPr lang="en-US" smtClean="0"/>
+              <a:rPr lang="en-US"/>
               <a:t>Click to edit Master text styles</a:t>
             </a:r>
           </a:p>
           <a:p>
             <a:pPr lvl="1"/>
             <a:r>
-              <a:rPr lang="en-US" smtClean="0"/>
+              <a:rPr lang="en-US"/>
               <a:t>Second level</a:t>
             </a:r>
           </a:p>
           <a:p>
             <a:pPr lvl="2"/>
             <a:r>
-              <a:rPr lang="en-US" smtClean="0"/>
+              <a:rPr lang="en-US"/>
               <a:t>Third level</a:t>
             </a:r>
           </a:p>
           <a:p>
             <a:pPr lvl="3"/>
             <a:r>
-              <a:rPr lang="en-US" smtClean="0"/>
+              <a:rPr lang="en-US"/>
               <a:t>Fourth level</a:t>
             </a:r>
           </a:p>
           <a:p>
             <a:pPr lvl="4"/>
             <a:r>
-              <a:rPr lang="en-US" smtClean="0"/>
+              <a:rPr lang="en-US"/>
               <a:t>Fifth level</a:t>
             </a:r>
-            <a:endParaRPr lang="en-US"/>
           </a:p>
         </p:txBody>
       </p:sp>
@@ -653,7 +647,7 @@
             <a:fld id="{D431C736-B0D3-41FF-8BF2-1A12F2835DC3}" type="datetimeFigureOut">
               <a:rPr lang="en-US" smtClean="0"/>
               <a:pPr/>
-              <a:t>10/23/2015</a:t>
+              <a:t>3/12/2017</a:t>
             </a:fld>
             <a:endParaRPr lang="en-US"/>
           </a:p>
@@ -743,10 +737,9 @@
           <a:lstStyle/>
           <a:p>
             <a:r>
-              <a:rPr lang="en-US" smtClean="0"/>
+              <a:rPr lang="en-US"/>
               <a:t>Click to edit Master title style</a:t>
             </a:r>
-            <a:endParaRPr lang="en-US"/>
           </a:p>
         </p:txBody>
       </p:sp>
@@ -767,38 +760,37 @@
           <a:p>
             <a:pPr lvl="0"/>
             <a:r>
-              <a:rPr lang="en-US" smtClean="0"/>
+              <a:rPr lang="en-US"/>
               <a:t>Click to edit Master text styles</a:t>
             </a:r>
           </a:p>
           <a:p>
             <a:pPr lvl="1"/>
             <a:r>
-              <a:rPr lang="en-US" smtClean="0"/>
+              <a:rPr lang="en-US"/>
               <a:t>Second level</a:t>
             </a:r>
           </a:p>
           <a:p>
             <a:pPr lvl="2"/>
             <a:r>
-              <a:rPr lang="en-US" smtClean="0"/>
+              <a:rPr lang="en-US"/>
               <a:t>Third level</a:t>
             </a:r>
           </a:p>
           <a:p>
             <a:pPr lvl="3"/>
             <a:r>
-              <a:rPr lang="en-US" smtClean="0"/>
+              <a:rPr lang="en-US"/>
               <a:t>Fourth level</a:t>
             </a:r>
           </a:p>
           <a:p>
             <a:pPr lvl="4"/>
             <a:r>
-              <a:rPr lang="en-US" smtClean="0"/>
+              <a:rPr lang="en-US"/>
               <a:t>Fifth level</a:t>
             </a:r>
-            <a:endParaRPr lang="en-US"/>
           </a:p>
         </p:txBody>
       </p:sp>
@@ -820,7 +812,7 @@
             <a:fld id="{D431C736-B0D3-41FF-8BF2-1A12F2835DC3}" type="datetimeFigureOut">
               <a:rPr lang="en-US" smtClean="0"/>
               <a:pPr/>
-              <a:t>10/23/2015</a:t>
+              <a:t>3/12/2017</a:t>
             </a:fld>
             <a:endParaRPr lang="en-US"/>
           </a:p>
@@ -919,10 +911,9 @@
           </a:lstStyle>
           <a:p>
             <a:r>
-              <a:rPr lang="en-US" smtClean="0"/>
+              <a:rPr lang="en-US"/>
               <a:t>Click to edit Master title style</a:t>
             </a:r>
-            <a:endParaRPr lang="en-US"/>
           </a:p>
         </p:txBody>
       </p:sp>
@@ -1039,7 +1030,7 @@
           <a:p>
             <a:pPr lvl="0"/>
             <a:r>
-              <a:rPr lang="en-US" smtClean="0"/>
+              <a:rPr lang="en-US"/>
               <a:t>Click to edit Master text styles</a:t>
             </a:r>
           </a:p>
@@ -1063,7 +1054,7 @@
             <a:fld id="{D431C736-B0D3-41FF-8BF2-1A12F2835DC3}" type="datetimeFigureOut">
               <a:rPr lang="en-US" smtClean="0"/>
               <a:pPr/>
-              <a:t>10/23/2015</a:t>
+              <a:t>3/12/2017</a:t>
             </a:fld>
             <a:endParaRPr lang="en-US"/>
           </a:p>
@@ -1153,10 +1144,9 @@
           <a:lstStyle/>
           <a:p>
             <a:r>
-              <a:rPr lang="en-US" smtClean="0"/>
+              <a:rPr lang="en-US"/>
               <a:t>Click to edit Master title style</a:t>
             </a:r>
-            <a:endParaRPr lang="en-US"/>
           </a:p>
         </p:txBody>
       </p:sp>
@@ -1210,38 +1200,37 @@
           <a:p>
             <a:pPr lvl="0"/>
             <a:r>
-              <a:rPr lang="en-US" smtClean="0"/>
+              <a:rPr lang="en-US"/>
               <a:t>Click to edit Master text styles</a:t>
             </a:r>
           </a:p>
           <a:p>
             <a:pPr lvl="1"/>
             <a:r>
-              <a:rPr lang="en-US" smtClean="0"/>
+              <a:rPr lang="en-US"/>
               <a:t>Second level</a:t>
             </a:r>
           </a:p>
           <a:p>
             <a:pPr lvl="2"/>
             <a:r>
-              <a:rPr lang="en-US" smtClean="0"/>
+              <a:rPr lang="en-US"/>
               <a:t>Third level</a:t>
             </a:r>
           </a:p>
           <a:p>
             <a:pPr lvl="3"/>
             <a:r>
-              <a:rPr lang="en-US" smtClean="0"/>
+              <a:rPr lang="en-US"/>
               <a:t>Fourth level</a:t>
             </a:r>
           </a:p>
           <a:p>
             <a:pPr lvl="4"/>
             <a:r>
-              <a:rPr lang="en-US" smtClean="0"/>
+              <a:rPr lang="en-US"/>
               <a:t>Fifth level</a:t>
             </a:r>
-            <a:endParaRPr lang="en-US"/>
           </a:p>
         </p:txBody>
       </p:sp>
@@ -1295,38 +1284,37 @@
           <a:p>
             <a:pPr lvl="0"/>
             <a:r>
-              <a:rPr lang="en-US" smtClean="0"/>
+              <a:rPr lang="en-US"/>
               <a:t>Click to edit Master text styles</a:t>
             </a:r>
           </a:p>
           <a:p>
             <a:pPr lvl="1"/>
             <a:r>
-              <a:rPr lang="en-US" smtClean="0"/>
+              <a:rPr lang="en-US"/>
               <a:t>Second level</a:t>
             </a:r>
           </a:p>
           <a:p>
             <a:pPr lvl="2"/>
             <a:r>
-              <a:rPr lang="en-US" smtClean="0"/>
+              <a:rPr lang="en-US"/>
               <a:t>Third level</a:t>
             </a:r>
           </a:p>
           <a:p>
             <a:pPr lvl="3"/>
             <a:r>
-              <a:rPr lang="en-US" smtClean="0"/>
+              <a:rPr lang="en-US"/>
               <a:t>Fourth level</a:t>
             </a:r>
           </a:p>
           <a:p>
             <a:pPr lvl="4"/>
             <a:r>
-              <a:rPr lang="en-US" smtClean="0"/>
+              <a:rPr lang="en-US"/>
               <a:t>Fifth level</a:t>
             </a:r>
-            <a:endParaRPr lang="en-US"/>
           </a:p>
         </p:txBody>
       </p:sp>
@@ -1348,7 +1336,7 @@
             <a:fld id="{D431C736-B0D3-41FF-8BF2-1A12F2835DC3}" type="datetimeFigureOut">
               <a:rPr lang="en-US" smtClean="0"/>
               <a:pPr/>
-              <a:t>10/23/2015</a:t>
+              <a:t>3/12/2017</a:t>
             </a:fld>
             <a:endParaRPr lang="en-US"/>
           </a:p>
@@ -1442,10 +1430,9 @@
           </a:lstStyle>
           <a:p>
             <a:r>
-              <a:rPr lang="en-US" smtClean="0"/>
+              <a:rPr lang="en-US"/>
               <a:t>Click to edit Master title style</a:t>
             </a:r>
-            <a:endParaRPr lang="en-US"/>
           </a:p>
         </p:txBody>
       </p:sp>
@@ -1508,7 +1495,7 @@
           <a:p>
             <a:pPr lvl="0"/>
             <a:r>
-              <a:rPr lang="en-US" smtClean="0"/>
+              <a:rPr lang="en-US"/>
               <a:t>Click to edit Master text styles</a:t>
             </a:r>
           </a:p>
@@ -1564,38 +1551,37 @@
           <a:p>
             <a:pPr lvl="0"/>
             <a:r>
-              <a:rPr lang="en-US" smtClean="0"/>
+              <a:rPr lang="en-US"/>
               <a:t>Click to edit Master text styles</a:t>
             </a:r>
           </a:p>
           <a:p>
             <a:pPr lvl="1"/>
             <a:r>
-              <a:rPr lang="en-US" smtClean="0"/>
+              <a:rPr lang="en-US"/>
               <a:t>Second level</a:t>
             </a:r>
           </a:p>
           <a:p>
             <a:pPr lvl="2"/>
             <a:r>
-              <a:rPr lang="en-US" smtClean="0"/>
+              <a:rPr lang="en-US"/>
               <a:t>Third level</a:t>
             </a:r>
           </a:p>
           <a:p>
             <a:pPr lvl="3"/>
             <a:r>
-              <a:rPr lang="en-US" smtClean="0"/>
+              <a:rPr lang="en-US"/>
               <a:t>Fourth level</a:t>
             </a:r>
           </a:p>
           <a:p>
             <a:pPr lvl="4"/>
             <a:r>
-              <a:rPr lang="en-US" smtClean="0"/>
+              <a:rPr lang="en-US"/>
               <a:t>Fifth level</a:t>
             </a:r>
-            <a:endParaRPr lang="en-US"/>
           </a:p>
         </p:txBody>
       </p:sp>
@@ -1658,7 +1644,7 @@
           <a:p>
             <a:pPr lvl="0"/>
             <a:r>
-              <a:rPr lang="en-US" smtClean="0"/>
+              <a:rPr lang="en-US"/>
               <a:t>Click to edit Master text styles</a:t>
             </a:r>
           </a:p>
@@ -1714,38 +1700,37 @@
           <a:p>
             <a:pPr lvl="0"/>
             <a:r>
-              <a:rPr lang="en-US" smtClean="0"/>
+              <a:rPr lang="en-US"/>
               <a:t>Click to edit Master text styles</a:t>
             </a:r>
           </a:p>
           <a:p>
             <a:pPr lvl="1"/>
             <a:r>
-              <a:rPr lang="en-US" smtClean="0"/>
+              <a:rPr lang="en-US"/>
               <a:t>Second level</a:t>
             </a:r>
           </a:p>
           <a:p>
             <a:pPr lvl="2"/>
             <a:r>
-              <a:rPr lang="en-US" smtClean="0"/>
+              <a:rPr lang="en-US"/>
               <a:t>Third level</a:t>
             </a:r>
           </a:p>
           <a:p>
             <a:pPr lvl="3"/>
             <a:r>
-              <a:rPr lang="en-US" smtClean="0"/>
+              <a:rPr lang="en-US"/>
               <a:t>Fourth level</a:t>
             </a:r>
           </a:p>
           <a:p>
             <a:pPr lvl="4"/>
             <a:r>
-              <a:rPr lang="en-US" smtClean="0"/>
+              <a:rPr lang="en-US"/>
               <a:t>Fifth level</a:t>
             </a:r>
-            <a:endParaRPr lang="en-US"/>
           </a:p>
         </p:txBody>
       </p:sp>
@@ -1767,7 +1752,7 @@
             <a:fld id="{D431C736-B0D3-41FF-8BF2-1A12F2835DC3}" type="datetimeFigureOut">
               <a:rPr lang="en-US" smtClean="0"/>
               <a:pPr/>
-              <a:t>10/23/2015</a:t>
+              <a:t>3/12/2017</a:t>
             </a:fld>
             <a:endParaRPr lang="en-US"/>
           </a:p>
@@ -1857,10 +1842,9 @@
           <a:lstStyle/>
           <a:p>
             <a:r>
-              <a:rPr lang="en-US" smtClean="0"/>
+              <a:rPr lang="en-US"/>
               <a:t>Click to edit Master title style</a:t>
             </a:r>
-            <a:endParaRPr lang="en-US"/>
           </a:p>
         </p:txBody>
       </p:sp>
@@ -1882,7 +1866,7 @@
             <a:fld id="{D431C736-B0D3-41FF-8BF2-1A12F2835DC3}" type="datetimeFigureOut">
               <a:rPr lang="en-US" smtClean="0"/>
               <a:pPr/>
-              <a:t>10/23/2015</a:t>
+              <a:t>3/12/2017</a:t>
             </a:fld>
             <a:endParaRPr lang="en-US"/>
           </a:p>
@@ -1974,7 +1958,7 @@
             <a:fld id="{D431C736-B0D3-41FF-8BF2-1A12F2835DC3}" type="datetimeFigureOut">
               <a:rPr lang="en-US" smtClean="0"/>
               <a:pPr/>
-              <a:t>10/23/2015</a:t>
+              <a:t>3/12/2017</a:t>
             </a:fld>
             <a:endParaRPr lang="en-US"/>
           </a:p>
@@ -2073,10 +2057,9 @@
           </a:lstStyle>
           <a:p>
             <a:r>
-              <a:rPr lang="en-US" smtClean="0"/>
+              <a:rPr lang="en-US"/>
               <a:t>Click to edit Master title style</a:t>
             </a:r>
-            <a:endParaRPr lang="en-US"/>
           </a:p>
         </p:txBody>
       </p:sp>
@@ -2130,38 +2113,37 @@
           <a:p>
             <a:pPr lvl="0"/>
             <a:r>
-              <a:rPr lang="en-US" smtClean="0"/>
+              <a:rPr lang="en-US"/>
               <a:t>Click to edit Master text styles</a:t>
             </a:r>
           </a:p>
           <a:p>
             <a:pPr lvl="1"/>
             <a:r>
-              <a:rPr lang="en-US" smtClean="0"/>
+              <a:rPr lang="en-US"/>
               <a:t>Second level</a:t>
             </a:r>
           </a:p>
           <a:p>
             <a:pPr lvl="2"/>
             <a:r>
-              <a:rPr lang="en-US" smtClean="0"/>
+              <a:rPr lang="en-US"/>
               <a:t>Third level</a:t>
             </a:r>
           </a:p>
           <a:p>
             <a:pPr lvl="3"/>
             <a:r>
-              <a:rPr lang="en-US" smtClean="0"/>
+              <a:rPr lang="en-US"/>
               <a:t>Fourth level</a:t>
             </a:r>
           </a:p>
           <a:p>
             <a:pPr lvl="4"/>
             <a:r>
-              <a:rPr lang="en-US" smtClean="0"/>
+              <a:rPr lang="en-US"/>
               <a:t>Fifth level</a:t>
             </a:r>
-            <a:endParaRPr lang="en-US"/>
           </a:p>
         </p:txBody>
       </p:sp>
@@ -2224,7 +2206,7 @@
           <a:p>
             <a:pPr lvl="0"/>
             <a:r>
-              <a:rPr lang="en-US" smtClean="0"/>
+              <a:rPr lang="en-US"/>
               <a:t>Click to edit Master text styles</a:t>
             </a:r>
           </a:p>
@@ -2248,7 +2230,7 @@
             <a:fld id="{D431C736-B0D3-41FF-8BF2-1A12F2835DC3}" type="datetimeFigureOut">
               <a:rPr lang="en-US" smtClean="0"/>
               <a:pPr/>
-              <a:t>10/23/2015</a:t>
+              <a:t>3/12/2017</a:t>
             </a:fld>
             <a:endParaRPr lang="en-US"/>
           </a:p>
@@ -2347,10 +2329,9 @@
           </a:lstStyle>
           <a:p>
             <a:r>
-              <a:rPr lang="en-US" smtClean="0"/>
+              <a:rPr lang="en-US"/>
               <a:t>Click to edit Master title style</a:t>
             </a:r>
-            <a:endParaRPr lang="en-US"/>
           </a:p>
         </p:txBody>
       </p:sp>
@@ -2474,7 +2455,7 @@
           <a:p>
             <a:pPr lvl="0"/>
             <a:r>
-              <a:rPr lang="en-US" smtClean="0"/>
+              <a:rPr lang="en-US"/>
               <a:t>Click to edit Master text styles</a:t>
             </a:r>
           </a:p>
@@ -2498,7 +2479,7 @@
             <a:fld id="{D431C736-B0D3-41FF-8BF2-1A12F2835DC3}" type="datetimeFigureOut">
               <a:rPr lang="en-US" smtClean="0"/>
               <a:pPr/>
-              <a:t>10/23/2015</a:t>
+              <a:t>3/12/2017</a:t>
             </a:fld>
             <a:endParaRPr lang="en-US"/>
           </a:p>
@@ -2603,10 +2584,9 @@
           <a:lstStyle/>
           <a:p>
             <a:r>
-              <a:rPr lang="en-US" smtClean="0"/>
+              <a:rPr lang="en-US"/>
               <a:t>Click to edit Master title style</a:t>
             </a:r>
-            <a:endParaRPr lang="en-US"/>
           </a:p>
         </p:txBody>
       </p:sp>
@@ -2637,38 +2617,37 @@
           <a:p>
             <a:pPr lvl="0"/>
             <a:r>
-              <a:rPr lang="en-US" smtClean="0"/>
+              <a:rPr lang="en-US"/>
               <a:t>Click to edit Master text styles</a:t>
             </a:r>
           </a:p>
           <a:p>
             <a:pPr lvl="1"/>
             <a:r>
-              <a:rPr lang="en-US" smtClean="0"/>
+              <a:rPr lang="en-US"/>
               <a:t>Second level</a:t>
             </a:r>
           </a:p>
           <a:p>
             <a:pPr lvl="2"/>
             <a:r>
-              <a:rPr lang="en-US" smtClean="0"/>
+              <a:rPr lang="en-US"/>
               <a:t>Third level</a:t>
             </a:r>
           </a:p>
           <a:p>
             <a:pPr lvl="3"/>
             <a:r>
-              <a:rPr lang="en-US" smtClean="0"/>
+              <a:rPr lang="en-US"/>
               <a:t>Fourth level</a:t>
             </a:r>
           </a:p>
           <a:p>
             <a:pPr lvl="4"/>
             <a:r>
-              <a:rPr lang="en-US" smtClean="0"/>
+              <a:rPr lang="en-US"/>
               <a:t>Fifth level</a:t>
             </a:r>
-            <a:endParaRPr lang="en-US"/>
           </a:p>
         </p:txBody>
       </p:sp>
@@ -2708,7 +2687,7 @@
             <a:fld id="{D431C736-B0D3-41FF-8BF2-1A12F2835DC3}" type="datetimeFigureOut">
               <a:rPr lang="en-US" smtClean="0"/>
               <a:pPr/>
-              <a:t>10/23/2015</a:t>
+              <a:t>3/12/2017</a:t>
             </a:fld>
             <a:endParaRPr lang="en-US"/>
           </a:p>
@@ -3410,10 +3389,9 @@
           <a:p>
             <a:pPr algn="ctr"/>
             <a:r>
-              <a:rPr lang="en-US" sz="1100" dirty="0" smtClean="0"/>
+              <a:rPr lang="en-US" sz="1100" dirty="0"/>
               <a:t>Detect</a:t>
             </a:r>
-            <a:endParaRPr lang="en-US" sz="1100" dirty="0"/>
           </a:p>
         </p:txBody>
       </p:sp>
@@ -3452,10 +3430,9 @@
           <a:p>
             <a:pPr algn="ctr"/>
             <a:r>
-              <a:rPr lang="en-US" sz="1100" dirty="0" smtClean="0"/>
+              <a:rPr lang="en-US" sz="1100" dirty="0"/>
               <a:t>Transform</a:t>
             </a:r>
-            <a:endParaRPr lang="en-US" sz="1100" dirty="0"/>
           </a:p>
         </p:txBody>
       </p:sp>
@@ -3494,10 +3471,9 @@
           <a:p>
             <a:pPr algn="ctr"/>
             <a:r>
-              <a:rPr lang="en-US" sz="1100" dirty="0" smtClean="0"/>
+              <a:rPr lang="en-US" sz="1100" dirty="0"/>
               <a:t>Dispatch</a:t>
             </a:r>
-            <a:endParaRPr lang="en-US" sz="1100" dirty="0"/>
           </a:p>
         </p:txBody>
       </p:sp>
@@ -4864,10 +4840,9 @@
           <a:p>
             <a:pPr algn="ctr"/>
             <a:r>
-              <a:rPr lang="en-US" sz="1100" dirty="0" smtClean="0"/>
+              <a:rPr lang="en-US" sz="1100" dirty="0"/>
               <a:t>Detect</a:t>
             </a:r>
-            <a:endParaRPr lang="en-US" sz="1100" dirty="0"/>
           </a:p>
         </p:txBody>
       </p:sp>
@@ -4906,10 +4881,9 @@
           <a:p>
             <a:pPr algn="ctr"/>
             <a:r>
-              <a:rPr lang="en-US" sz="1100" dirty="0" smtClean="0"/>
+              <a:rPr lang="en-US" sz="1100" dirty="0"/>
               <a:t>Transform</a:t>
             </a:r>
-            <a:endParaRPr lang="en-US" sz="1100" dirty="0"/>
           </a:p>
         </p:txBody>
       </p:sp>
@@ -4948,10 +4922,9 @@
           <a:p>
             <a:pPr algn="ctr"/>
             <a:r>
-              <a:rPr lang="en-US" sz="1100" dirty="0" smtClean="0"/>
+              <a:rPr lang="en-US" sz="1100" dirty="0"/>
               <a:t>Dispatch</a:t>
             </a:r>
-            <a:endParaRPr lang="en-US" sz="1100" dirty="0"/>
           </a:p>
         </p:txBody>
       </p:sp>
@@ -5062,10 +5035,9 @@
           <a:p>
             <a:pPr algn="ctr"/>
             <a:r>
-              <a:rPr lang="en-US" sz="1100" dirty="0" smtClean="0"/>
+              <a:rPr lang="en-US" sz="1100" dirty="0"/>
               <a:t>Detect</a:t>
             </a:r>
-            <a:endParaRPr lang="en-US" sz="1100" dirty="0"/>
           </a:p>
         </p:txBody>
       </p:sp>
@@ -5104,10 +5076,9 @@
           <a:p>
             <a:pPr algn="ctr"/>
             <a:r>
-              <a:rPr lang="en-US" sz="1100" dirty="0" smtClean="0"/>
+              <a:rPr lang="en-US" sz="1100" dirty="0"/>
               <a:t>Transform</a:t>
             </a:r>
-            <a:endParaRPr lang="en-US" sz="1100" dirty="0"/>
           </a:p>
         </p:txBody>
       </p:sp>
@@ -5146,10 +5117,9 @@
           <a:p>
             <a:pPr algn="ctr"/>
             <a:r>
-              <a:rPr lang="en-US" sz="1100" dirty="0" smtClean="0"/>
+              <a:rPr lang="en-US" sz="1100" dirty="0"/>
               <a:t>Dispatch</a:t>
             </a:r>
-            <a:endParaRPr lang="en-US" sz="1100" dirty="0"/>
           </a:p>
         </p:txBody>
       </p:sp>
@@ -5260,10 +5230,9 @@
           <a:p>
             <a:pPr algn="ctr"/>
             <a:r>
-              <a:rPr lang="en-US" sz="1100" dirty="0" smtClean="0"/>
+              <a:rPr lang="en-US" sz="1100" dirty="0"/>
               <a:t>Detect</a:t>
             </a:r>
-            <a:endParaRPr lang="en-US" sz="1100" dirty="0"/>
           </a:p>
         </p:txBody>
       </p:sp>
@@ -5302,10 +5271,9 @@
           <a:p>
             <a:pPr algn="ctr"/>
             <a:r>
-              <a:rPr lang="en-US" sz="1100" dirty="0" smtClean="0"/>
+              <a:rPr lang="en-US" sz="1100" dirty="0"/>
               <a:t>Transform</a:t>
             </a:r>
-            <a:endParaRPr lang="en-US" sz="1100" dirty="0"/>
           </a:p>
         </p:txBody>
       </p:sp>
@@ -5344,10 +5312,9 @@
           <a:p>
             <a:pPr algn="ctr"/>
             <a:r>
-              <a:rPr lang="en-US" sz="1100" dirty="0" smtClean="0"/>
+              <a:rPr lang="en-US" sz="1100" dirty="0"/>
               <a:t>Dispatch</a:t>
             </a:r>
-            <a:endParaRPr lang="en-US" sz="1100" dirty="0"/>
           </a:p>
         </p:txBody>
       </p:sp>
@@ -5662,17 +5629,16 @@
           <a:lstStyle/>
           <a:p>
             <a:r>
-              <a:rPr lang="en-US" dirty="0" smtClean="0"/>
+              <a:rPr lang="en-US" dirty="0"/>
               <a:t>MIDI</a:t>
             </a:r>
           </a:p>
           <a:p>
             <a:pPr algn="ctr"/>
             <a:r>
-              <a:rPr lang="en-US" dirty="0" smtClean="0"/>
+              <a:rPr lang="en-US" dirty="0"/>
               <a:t>In</a:t>
             </a:r>
-            <a:endParaRPr lang="en-US" dirty="0"/>
           </a:p>
         </p:txBody>
       </p:sp>
@@ -5699,17 +5665,16 @@
           <a:lstStyle/>
           <a:p>
             <a:r>
-              <a:rPr lang="en-US" dirty="0" smtClean="0"/>
+              <a:rPr lang="en-US" dirty="0"/>
               <a:t>MIDI</a:t>
             </a:r>
           </a:p>
           <a:p>
             <a:pPr algn="ctr"/>
             <a:r>
-              <a:rPr lang="en-US" dirty="0" smtClean="0"/>
+              <a:rPr lang="en-US" dirty="0"/>
               <a:t>Out</a:t>
             </a:r>
-            <a:endParaRPr lang="en-US" dirty="0"/>
           </a:p>
         </p:txBody>
       </p:sp>
@@ -5773,7 +5738,7 @@
           <a:p>
             <a:pPr algn="ctr"/>
             <a:r>
-              <a:rPr lang="en-US" sz="1100" dirty="0" smtClean="0"/>
+              <a:rPr lang="en-US" sz="1100" dirty="0"/>
               <a:t>Patch</a:t>
             </a:r>
           </a:p>
@@ -5814,7 +5779,7 @@
           <a:p>
             <a:pPr algn="ctr"/>
             <a:r>
-              <a:rPr lang="en-US" sz="1100" dirty="0" smtClean="0"/>
+              <a:rPr lang="en-US" sz="1100" dirty="0"/>
               <a:t>Map 1</a:t>
             </a:r>
           </a:p>
@@ -5855,10 +5820,9 @@
           <a:p>
             <a:pPr algn="ctr"/>
             <a:r>
-              <a:rPr lang="en-US" sz="1100" dirty="0" smtClean="0"/>
+              <a:rPr lang="en-US" sz="1100" dirty="0"/>
               <a:t>Detection</a:t>
             </a:r>
-            <a:endParaRPr lang="en-US" sz="1100" dirty="0"/>
           </a:p>
         </p:txBody>
       </p:sp>
@@ -5897,7 +5861,7 @@
           <a:p>
             <a:pPr algn="ctr"/>
             <a:r>
-              <a:rPr lang="en-US" sz="1100" dirty="0" smtClean="0"/>
+              <a:rPr lang="en-US" sz="1100" dirty="0"/>
               <a:t>Transform</a:t>
             </a:r>
           </a:p>
@@ -5938,7 +5902,7 @@
           <a:p>
             <a:pPr algn="ctr"/>
             <a:r>
-              <a:rPr lang="en-US" sz="1100" dirty="0" smtClean="0"/>
+              <a:rPr lang="en-US" sz="1100" dirty="0"/>
               <a:t>Transform</a:t>
             </a:r>
           </a:p>
@@ -5979,7 +5943,7 @@
           <a:p>
             <a:pPr algn="ctr"/>
             <a:r>
-              <a:rPr lang="en-US" sz="1100" dirty="0" smtClean="0"/>
+              <a:rPr lang="en-US" sz="1100" dirty="0"/>
               <a:t>Transform</a:t>
             </a:r>
           </a:p>
@@ -6020,7 +5984,7 @@
           <a:p>
             <a:pPr algn="ctr"/>
             <a:r>
-              <a:rPr lang="en-US" sz="1100" dirty="0" smtClean="0"/>
+              <a:rPr lang="en-US" sz="1100" dirty="0"/>
               <a:t>Transform</a:t>
             </a:r>
           </a:p>
@@ -6061,7 +6025,7 @@
           <a:p>
             <a:pPr algn="ctr"/>
             <a:r>
-              <a:rPr lang="en-US" sz="1100" dirty="0" smtClean="0"/>
+              <a:rPr lang="en-US" sz="1100" dirty="0"/>
               <a:t>Transform</a:t>
             </a:r>
           </a:p>
@@ -6102,10 +6066,9 @@
           <a:p>
             <a:pPr algn="ctr"/>
             <a:r>
-              <a:rPr lang="en-US" sz="1100" dirty="0" smtClean="0"/>
+              <a:rPr lang="en-US" sz="1100" dirty="0"/>
               <a:t>Dispatcher</a:t>
             </a:r>
-            <a:endParaRPr lang="en-US" sz="1100" dirty="0"/>
           </a:p>
         </p:txBody>
       </p:sp>
@@ -6144,10 +6107,9 @@
           <a:p>
             <a:pPr algn="ctr"/>
             <a:r>
-              <a:rPr lang="en-US" sz="1100" dirty="0" smtClean="0"/>
+              <a:rPr lang="en-US" sz="1100" dirty="0"/>
               <a:t>Dispatcher</a:t>
             </a:r>
-            <a:endParaRPr lang="en-US" sz="1100" dirty="0"/>
           </a:p>
         </p:txBody>
       </p:sp>
@@ -6186,10 +6148,9 @@
           <a:p>
             <a:pPr algn="ctr"/>
             <a:r>
-              <a:rPr lang="en-US" sz="1100" dirty="0" smtClean="0"/>
+              <a:rPr lang="en-US" sz="1100" dirty="0"/>
               <a:t>Dispatcher</a:t>
             </a:r>
-            <a:endParaRPr lang="en-US" sz="1100" dirty="0"/>
           </a:p>
         </p:txBody>
       </p:sp>
@@ -6228,10 +6189,9 @@
           <a:p>
             <a:pPr algn="ctr"/>
             <a:r>
-              <a:rPr lang="en-US" sz="1100" dirty="0" smtClean="0"/>
+              <a:rPr lang="en-US" sz="1100" dirty="0"/>
               <a:t>Dispatcher</a:t>
             </a:r>
-            <a:endParaRPr lang="en-US" sz="1100" dirty="0"/>
           </a:p>
         </p:txBody>
       </p:sp>
@@ -6270,10 +6230,9 @@
           <a:p>
             <a:pPr algn="ctr"/>
             <a:r>
-              <a:rPr lang="en-US" sz="1100" dirty="0" smtClean="0"/>
+              <a:rPr lang="en-US" sz="1100" dirty="0"/>
               <a:t>Dispatcher</a:t>
             </a:r>
-            <a:endParaRPr lang="en-US" sz="1100" dirty="0"/>
           </a:p>
         </p:txBody>
       </p:sp>
@@ -6312,10 +6271,9 @@
           <a:p>
             <a:pPr algn="ctr"/>
             <a:r>
-              <a:rPr lang="en-US" sz="1100" dirty="0" smtClean="0"/>
+              <a:rPr lang="en-US" sz="1100" dirty="0"/>
               <a:t>Detection</a:t>
             </a:r>
-            <a:endParaRPr lang="en-US" sz="1100" dirty="0"/>
           </a:p>
         </p:txBody>
       </p:sp>
@@ -6354,10 +6312,9 @@
           <a:p>
             <a:pPr algn="ctr"/>
             <a:r>
-              <a:rPr lang="en-US" sz="1100" dirty="0" smtClean="0"/>
+              <a:rPr lang="en-US" sz="1100" dirty="0"/>
               <a:t>Detection</a:t>
             </a:r>
-            <a:endParaRPr lang="en-US" sz="1100" dirty="0"/>
           </a:p>
         </p:txBody>
       </p:sp>
@@ -6396,10 +6353,9 @@
           <a:p>
             <a:pPr algn="ctr"/>
             <a:r>
-              <a:rPr lang="en-US" sz="1100" dirty="0" smtClean="0"/>
+              <a:rPr lang="en-US" sz="1100" dirty="0"/>
               <a:t>Detection</a:t>
             </a:r>
-            <a:endParaRPr lang="en-US" sz="1100" dirty="0"/>
           </a:p>
         </p:txBody>
       </p:sp>
@@ -6438,10 +6394,9 @@
           <a:p>
             <a:pPr algn="ctr"/>
             <a:r>
-              <a:rPr lang="en-US" sz="1100" dirty="0" smtClean="0"/>
+              <a:rPr lang="en-US" sz="1100" dirty="0"/>
               <a:t>Detection</a:t>
             </a:r>
-            <a:endParaRPr lang="en-US" sz="1100" dirty="0"/>
           </a:p>
         </p:txBody>
       </p:sp>
@@ -6480,10 +6435,9 @@
           <a:p>
             <a:pPr algn="ctr"/>
             <a:r>
-              <a:rPr lang="en-US" sz="1100" dirty="0" smtClean="0"/>
+              <a:rPr lang="en-US" sz="1100" dirty="0"/>
               <a:t>Detection</a:t>
             </a:r>
-            <a:endParaRPr lang="en-US" sz="1100" dirty="0"/>
           </a:p>
         </p:txBody>
       </p:sp>
@@ -6522,10 +6476,9 @@
           <a:p>
             <a:pPr algn="ctr"/>
             <a:r>
-              <a:rPr lang="en-US" sz="1100" dirty="0" smtClean="0"/>
+              <a:rPr lang="en-US" sz="1100" dirty="0"/>
               <a:t>Detection</a:t>
             </a:r>
-            <a:endParaRPr lang="en-US" sz="1100" dirty="0"/>
           </a:p>
         </p:txBody>
       </p:sp>
@@ -6564,10 +6517,9 @@
           <a:p>
             <a:pPr algn="ctr"/>
             <a:r>
-              <a:rPr lang="en-US" sz="1100" dirty="0" smtClean="0"/>
+              <a:rPr lang="en-US" sz="1100" dirty="0"/>
               <a:t>Detection</a:t>
             </a:r>
-            <a:endParaRPr lang="en-US" sz="1100" dirty="0"/>
           </a:p>
         </p:txBody>
       </p:sp>
@@ -6606,7 +6558,7 @@
           <a:p>
             <a:pPr algn="ctr"/>
             <a:r>
-              <a:rPr lang="en-US" sz="1100" dirty="0" smtClean="0"/>
+              <a:rPr lang="en-US" sz="1100" dirty="0"/>
               <a:t>Transform</a:t>
             </a:r>
           </a:p>
@@ -6647,7 +6599,7 @@
           <a:p>
             <a:pPr algn="ctr"/>
             <a:r>
-              <a:rPr lang="en-US" sz="1100" dirty="0" smtClean="0"/>
+              <a:rPr lang="en-US" sz="1100" dirty="0"/>
               <a:t>Transform</a:t>
             </a:r>
           </a:p>
@@ -6688,7 +6640,7 @@
           <a:p>
             <a:pPr algn="ctr"/>
             <a:r>
-              <a:rPr lang="en-US" sz="1100" dirty="0" smtClean="0"/>
+              <a:rPr lang="en-US" sz="1100" dirty="0"/>
               <a:t>Transform</a:t>
             </a:r>
           </a:p>
@@ -6729,10 +6681,9 @@
           <a:p>
             <a:pPr algn="ctr"/>
             <a:r>
-              <a:rPr lang="en-US" sz="1100" dirty="0" smtClean="0"/>
+              <a:rPr lang="en-US" sz="1100" dirty="0"/>
               <a:t>Dispatcher</a:t>
             </a:r>
-            <a:endParaRPr lang="en-US" sz="1100" dirty="0"/>
           </a:p>
         </p:txBody>
       </p:sp>
@@ -6771,10 +6722,9 @@
           <a:p>
             <a:pPr algn="ctr"/>
             <a:r>
-              <a:rPr lang="en-US" sz="1100" dirty="0" smtClean="0"/>
+              <a:rPr lang="en-US" sz="1100" dirty="0"/>
               <a:t>Dispatcher</a:t>
             </a:r>
-            <a:endParaRPr lang="en-US" sz="1100" dirty="0"/>
           </a:p>
         </p:txBody>
       </p:sp>
@@ -6813,10 +6763,9 @@
           <a:p>
             <a:pPr algn="ctr"/>
             <a:r>
-              <a:rPr lang="en-US" sz="1100" dirty="0" smtClean="0"/>
+              <a:rPr lang="en-US" sz="1100" dirty="0"/>
               <a:t>Dispatcher</a:t>
             </a:r>
-            <a:endParaRPr lang="en-US" sz="1100" dirty="0"/>
           </a:p>
         </p:txBody>
       </p:sp>
@@ -6855,10 +6804,9 @@
           <a:p>
             <a:pPr algn="ctr"/>
             <a:r>
-              <a:rPr lang="en-US" sz="1100" dirty="0" smtClean="0"/>
+              <a:rPr lang="en-US" sz="1100" dirty="0"/>
               <a:t>Detection</a:t>
             </a:r>
-            <a:endParaRPr lang="en-US" sz="1100" dirty="0"/>
           </a:p>
         </p:txBody>
       </p:sp>
@@ -6897,10 +6845,9 @@
           <a:p>
             <a:pPr algn="ctr"/>
             <a:r>
-              <a:rPr lang="en-US" sz="1100" dirty="0" smtClean="0"/>
+              <a:rPr lang="en-US" sz="1100" dirty="0"/>
               <a:t>Detection</a:t>
             </a:r>
-            <a:endParaRPr lang="en-US" sz="1100" dirty="0"/>
           </a:p>
         </p:txBody>
       </p:sp>
@@ -6939,10 +6886,9 @@
           <a:p>
             <a:pPr algn="ctr"/>
             <a:r>
-              <a:rPr lang="en-US" sz="1100" dirty="0" smtClean="0"/>
+              <a:rPr lang="en-US" sz="1100" dirty="0"/>
               <a:t>Detection</a:t>
             </a:r>
-            <a:endParaRPr lang="en-US" sz="1100" dirty="0"/>
           </a:p>
         </p:txBody>
       </p:sp>
@@ -6981,10 +6927,9 @@
           <a:p>
             <a:pPr algn="ctr"/>
             <a:r>
-              <a:rPr lang="en-US" sz="1100" dirty="0" smtClean="0"/>
+              <a:rPr lang="en-US" sz="1100" dirty="0"/>
               <a:t>Detection</a:t>
             </a:r>
-            <a:endParaRPr lang="en-US" sz="1100" dirty="0"/>
           </a:p>
         </p:txBody>
       </p:sp>
@@ -7023,7 +6968,7 @@
           <a:p>
             <a:pPr algn="ctr"/>
             <a:r>
-              <a:rPr lang="en-US" sz="1100" dirty="0" smtClean="0"/>
+              <a:rPr lang="en-US" sz="1100" dirty="0"/>
               <a:t>Patch</a:t>
             </a:r>
           </a:p>
@@ -7064,7 +7009,7 @@
           <a:p>
             <a:pPr algn="ctr"/>
             <a:r>
-              <a:rPr lang="en-US" sz="1100" dirty="0" smtClean="0"/>
+              <a:rPr lang="en-US" sz="1100" dirty="0"/>
               <a:t>Patch</a:t>
             </a:r>
           </a:p>
@@ -7105,7 +7050,7 @@
           <a:p>
             <a:pPr algn="ctr"/>
             <a:r>
-              <a:rPr lang="en-US" sz="1100" dirty="0" smtClean="0"/>
+              <a:rPr lang="en-US" sz="1100" dirty="0"/>
               <a:t>Patch</a:t>
             </a:r>
           </a:p>
@@ -7146,7 +7091,7 @@
           <a:p>
             <a:pPr algn="ctr"/>
             <a:r>
-              <a:rPr lang="en-US" sz="1100" dirty="0" smtClean="0"/>
+              <a:rPr lang="en-US" sz="1100" dirty="0"/>
               <a:t>Patch</a:t>
             </a:r>
           </a:p>
@@ -7187,7 +7132,7 @@
           <a:p>
             <a:pPr algn="ctr"/>
             <a:r>
-              <a:rPr lang="en-US" sz="1100" dirty="0" smtClean="0"/>
+              <a:rPr lang="en-US" sz="1100" dirty="0"/>
               <a:t>Patch</a:t>
             </a:r>
           </a:p>
@@ -7228,7 +7173,7 @@
           <a:p>
             <a:pPr algn="ctr"/>
             <a:r>
-              <a:rPr lang="en-US" sz="1100" dirty="0" smtClean="0"/>
+              <a:rPr lang="en-US" sz="1100" dirty="0"/>
               <a:t>Patch</a:t>
             </a:r>
           </a:p>
@@ -7269,7 +7214,7 @@
           <a:p>
             <a:pPr algn="ctr"/>
             <a:r>
-              <a:rPr lang="en-US" sz="1100" dirty="0" smtClean="0"/>
+              <a:rPr lang="en-US" sz="1100" dirty="0"/>
               <a:t>Patch</a:t>
             </a:r>
           </a:p>
@@ -7310,7 +7255,7 @@
           <a:p>
             <a:pPr algn="ctr"/>
             <a:r>
-              <a:rPr lang="en-US" sz="1100" dirty="0" smtClean="0"/>
+              <a:rPr lang="en-US" sz="1100" dirty="0"/>
               <a:t>Patch</a:t>
             </a:r>
           </a:p>
@@ -7351,7 +7296,7 @@
           <a:p>
             <a:pPr algn="ctr"/>
             <a:r>
-              <a:rPr lang="en-US" sz="1100" dirty="0" smtClean="0"/>
+              <a:rPr lang="en-US" sz="1100" dirty="0"/>
               <a:t>Patch</a:t>
             </a:r>
           </a:p>
@@ -7392,7 +7337,7 @@
           <a:p>
             <a:pPr algn="ctr"/>
             <a:r>
-              <a:rPr lang="en-US" sz="1100" dirty="0" smtClean="0"/>
+              <a:rPr lang="en-US" sz="1100" dirty="0"/>
               <a:t>Patch</a:t>
             </a:r>
           </a:p>
@@ -7433,7 +7378,7 @@
           <a:p>
             <a:pPr algn="ctr"/>
             <a:r>
-              <a:rPr lang="en-US" sz="1100" dirty="0" smtClean="0"/>
+              <a:rPr lang="en-US" sz="1100" dirty="0"/>
               <a:t>Patch</a:t>
             </a:r>
           </a:p>
@@ -7474,7 +7419,7 @@
           <a:p>
             <a:pPr algn="ctr"/>
             <a:r>
-              <a:rPr lang="en-US" sz="1100" dirty="0" smtClean="0"/>
+              <a:rPr lang="en-US" sz="1100" dirty="0"/>
               <a:t>Patch</a:t>
             </a:r>
           </a:p>
@@ -7515,7 +7460,7 @@
           <a:p>
             <a:pPr algn="ctr"/>
             <a:r>
-              <a:rPr lang="en-US" sz="1100" dirty="0" smtClean="0"/>
+              <a:rPr lang="en-US" sz="1100" dirty="0"/>
               <a:t>Patch</a:t>
             </a:r>
           </a:p>
@@ -7556,7 +7501,7 @@
           <a:p>
             <a:pPr algn="ctr"/>
             <a:r>
-              <a:rPr lang="en-US" sz="1100" dirty="0" smtClean="0"/>
+              <a:rPr lang="en-US" sz="1100" dirty="0"/>
               <a:t>Patch</a:t>
             </a:r>
           </a:p>
@@ -7597,7 +7542,7 @@
           <a:p>
             <a:pPr algn="ctr"/>
             <a:r>
-              <a:rPr lang="en-US" sz="1100" dirty="0" smtClean="0"/>
+              <a:rPr lang="en-US" sz="1100" dirty="0"/>
               <a:t>Patch</a:t>
             </a:r>
           </a:p>
@@ -7638,7 +7583,7 @@
           <a:p>
             <a:pPr algn="ctr"/>
             <a:r>
-              <a:rPr lang="en-US" sz="1100" dirty="0" smtClean="0"/>
+              <a:rPr lang="en-US" sz="1100" dirty="0"/>
               <a:t>Patch</a:t>
             </a:r>
           </a:p>
@@ -7679,7 +7624,7 @@
           <a:p>
             <a:pPr algn="ctr"/>
             <a:r>
-              <a:rPr lang="en-US" sz="1100" dirty="0" smtClean="0"/>
+              <a:rPr lang="en-US" sz="1100" dirty="0"/>
               <a:t>Patch</a:t>
             </a:r>
           </a:p>
@@ -7720,7 +7665,7 @@
           <a:p>
             <a:pPr algn="ctr"/>
             <a:r>
-              <a:rPr lang="en-US" sz="1100" dirty="0" smtClean="0"/>
+              <a:rPr lang="en-US" sz="1100" dirty="0"/>
               <a:t>Patch</a:t>
             </a:r>
           </a:p>
@@ -7761,7 +7706,7 @@
           <a:p>
             <a:pPr algn="ctr"/>
             <a:r>
-              <a:rPr lang="en-US" sz="1100" dirty="0" smtClean="0"/>
+              <a:rPr lang="en-US" sz="1100" dirty="0"/>
               <a:t>Patch</a:t>
             </a:r>
           </a:p>
@@ -7802,7 +7747,7 @@
           <a:p>
             <a:pPr algn="ctr"/>
             <a:r>
-              <a:rPr lang="en-US" sz="1100" dirty="0" smtClean="0"/>
+              <a:rPr lang="en-US" sz="1100" dirty="0"/>
               <a:t>Patch</a:t>
             </a:r>
           </a:p>
@@ -7843,7 +7788,7 @@
           <a:p>
             <a:pPr algn="ctr"/>
             <a:r>
-              <a:rPr lang="en-US" sz="1100" dirty="0" smtClean="0"/>
+              <a:rPr lang="en-US" sz="1100" dirty="0"/>
               <a:t>Patch</a:t>
             </a:r>
           </a:p>
@@ -7884,7 +7829,7 @@
           <a:p>
             <a:pPr algn="ctr"/>
             <a:r>
-              <a:rPr lang="en-US" sz="1100" dirty="0" smtClean="0"/>
+              <a:rPr lang="en-US" sz="1100" dirty="0"/>
               <a:t>Patch</a:t>
             </a:r>
           </a:p>
@@ -7925,7 +7870,7 @@
           <a:p>
             <a:pPr algn="ctr"/>
             <a:r>
-              <a:rPr lang="en-US" sz="1100" dirty="0" smtClean="0"/>
+              <a:rPr lang="en-US" sz="1100" dirty="0"/>
               <a:t>Patch</a:t>
             </a:r>
           </a:p>
@@ -7966,7 +7911,7 @@
           <a:p>
             <a:pPr algn="ctr"/>
             <a:r>
-              <a:rPr lang="en-US" sz="1100" dirty="0" smtClean="0"/>
+              <a:rPr lang="en-US" sz="1100" dirty="0"/>
               <a:t>Patch</a:t>
             </a:r>
           </a:p>
@@ -8007,7 +7952,7 @@
           <a:p>
             <a:pPr algn="ctr"/>
             <a:r>
-              <a:rPr lang="en-US" sz="1100" dirty="0" smtClean="0"/>
+              <a:rPr lang="en-US" sz="1100" dirty="0"/>
               <a:t>Patch</a:t>
             </a:r>
           </a:p>
@@ -8048,7 +7993,7 @@
           <a:p>
             <a:pPr algn="ctr"/>
             <a:r>
-              <a:rPr lang="en-US" sz="1100" dirty="0" smtClean="0"/>
+              <a:rPr lang="en-US" sz="1100" dirty="0"/>
               <a:t>Patch</a:t>
             </a:r>
           </a:p>
@@ -8089,7 +8034,7 @@
           <a:p>
             <a:pPr algn="ctr"/>
             <a:r>
-              <a:rPr lang="en-US" sz="1100" dirty="0" smtClean="0"/>
+              <a:rPr lang="en-US" sz="1100" dirty="0"/>
               <a:t>Patch</a:t>
             </a:r>
           </a:p>
@@ -8130,7 +8075,7 @@
           <a:p>
             <a:pPr algn="ctr"/>
             <a:r>
-              <a:rPr lang="en-US" sz="1100" dirty="0" smtClean="0"/>
+              <a:rPr lang="en-US" sz="1100" dirty="0"/>
               <a:t>Patch</a:t>
             </a:r>
           </a:p>
@@ -8171,7 +8116,7 @@
           <a:p>
             <a:pPr algn="ctr"/>
             <a:r>
-              <a:rPr lang="en-US" sz="1100" dirty="0" smtClean="0"/>
+              <a:rPr lang="en-US" sz="1100" dirty="0"/>
               <a:t>Patch</a:t>
             </a:r>
           </a:p>
@@ -8212,7 +8157,7 @@
           <a:p>
             <a:pPr algn="ctr"/>
             <a:r>
-              <a:rPr lang="en-US" sz="1100" dirty="0" smtClean="0"/>
+              <a:rPr lang="en-US" sz="1100" dirty="0"/>
               <a:t>Patch</a:t>
             </a:r>
           </a:p>
@@ -8253,7 +8198,7 @@
           <a:p>
             <a:pPr algn="ctr"/>
             <a:r>
-              <a:rPr lang="en-US" sz="1100" dirty="0" smtClean="0"/>
+              <a:rPr lang="en-US" sz="1100" dirty="0"/>
               <a:t>Patch</a:t>
             </a:r>
           </a:p>
@@ -8294,7 +8239,7 @@
           <a:p>
             <a:pPr algn="ctr"/>
             <a:r>
-              <a:rPr lang="en-US" sz="1100" dirty="0" smtClean="0"/>
+              <a:rPr lang="en-US" sz="1100" dirty="0"/>
               <a:t>Patch</a:t>
             </a:r>
           </a:p>
@@ -8323,10 +8268,9 @@
           <a:lstStyle/>
           <a:p>
             <a:r>
-              <a:rPr lang="en-US" sz="1200" dirty="0" smtClean="0"/>
+              <a:rPr lang="en-US" sz="1200" dirty="0"/>
               <a:t>RAM Working Memory Fixed Layout</a:t>
             </a:r>
-            <a:endParaRPr lang="en-US" sz="1200" dirty="0"/>
           </a:p>
         </p:txBody>
       </p:sp>
@@ -8353,10 +8297,9 @@
           <a:lstStyle/>
           <a:p>
             <a:r>
-              <a:rPr lang="en-US" sz="1200" dirty="0" smtClean="0"/>
+              <a:rPr lang="en-US" sz="1200" dirty="0"/>
               <a:t>EEPROM Storage Memory</a:t>
             </a:r>
-            <a:endParaRPr lang="en-US" sz="1200" dirty="0"/>
           </a:p>
         </p:txBody>
       </p:sp>
@@ -8383,10 +8326,9 @@
           <a:lstStyle/>
           <a:p>
             <a:r>
-              <a:rPr lang="en-US" sz="1200" dirty="0" smtClean="0"/>
+              <a:rPr lang="en-US" sz="1200" dirty="0"/>
               <a:t>32 Patches</a:t>
             </a:r>
-            <a:endParaRPr lang="en-US" sz="1200" dirty="0"/>
           </a:p>
         </p:txBody>
       </p:sp>
@@ -8413,28 +8355,27 @@
           <a:lstStyle/>
           <a:p>
             <a:r>
-              <a:rPr lang="en-US" sz="1200" dirty="0" smtClean="0"/>
+              <a:rPr lang="en-US" sz="1200" dirty="0"/>
               <a:t>1 Map</a:t>
             </a:r>
           </a:p>
           <a:p>
             <a:r>
-              <a:rPr lang="en-US" sz="1200" dirty="0" smtClean="0"/>
+              <a:rPr lang="en-US" sz="1200" dirty="0"/>
               <a:t>12 Detections</a:t>
             </a:r>
           </a:p>
           <a:p>
             <a:r>
-              <a:rPr lang="en-US" sz="1200" dirty="0" smtClean="0"/>
+              <a:rPr lang="en-US" sz="1200" dirty="0"/>
               <a:t>8 Transforms</a:t>
             </a:r>
           </a:p>
           <a:p>
             <a:r>
-              <a:rPr lang="en-US" sz="1200" dirty="0" smtClean="0"/>
+              <a:rPr lang="en-US" sz="1200" dirty="0"/>
               <a:t>8 Dispatchers</a:t>
             </a:r>
-            <a:endParaRPr lang="en-US" sz="1200" dirty="0"/>
           </a:p>
         </p:txBody>
       </p:sp>
@@ -8473,14 +8414,14 @@
           <a:p>
             <a:pPr algn="ctr"/>
             <a:r>
-              <a:rPr lang="en-US" sz="1100" dirty="0" smtClean="0"/>
+              <a:rPr lang="en-US" sz="1100" dirty="0"/>
               <a:t>Map</a:t>
             </a:r>
           </a:p>
           <a:p>
             <a:pPr algn="ctr"/>
             <a:r>
-              <a:rPr lang="en-US" sz="1100" dirty="0" smtClean="0"/>
+              <a:rPr lang="en-US" sz="1100" dirty="0"/>
               <a:t>2</a:t>
             </a:r>
           </a:p>
@@ -8521,14 +8462,14 @@
           <a:p>
             <a:pPr algn="ctr"/>
             <a:r>
-              <a:rPr lang="en-US" sz="1100" dirty="0" smtClean="0"/>
+              <a:rPr lang="en-US" sz="1100" dirty="0"/>
               <a:t>Map</a:t>
             </a:r>
           </a:p>
           <a:p>
             <a:pPr algn="ctr"/>
             <a:r>
-              <a:rPr lang="en-US" sz="1100" dirty="0" smtClean="0"/>
+              <a:rPr lang="en-US" sz="1100" dirty="0"/>
               <a:t>3</a:t>
             </a:r>
           </a:p>
@@ -8569,14 +8510,14 @@
           <a:p>
             <a:pPr algn="ctr"/>
             <a:r>
-              <a:rPr lang="en-US" sz="1100" dirty="0" smtClean="0"/>
+              <a:rPr lang="en-US" sz="1100" dirty="0"/>
               <a:t>Map</a:t>
             </a:r>
           </a:p>
           <a:p>
             <a:pPr algn="ctr"/>
             <a:r>
-              <a:rPr lang="en-US" sz="1100" dirty="0" smtClean="0"/>
+              <a:rPr lang="en-US" sz="1100" dirty="0"/>
               <a:t>4</a:t>
             </a:r>
           </a:p>
@@ -8644,7 +8585,7 @@
           <a:p>
             <a:pPr algn="ctr"/>
             <a:r>
-              <a:rPr lang="en-US" dirty="0" smtClean="0"/>
+              <a:rPr lang="en-US" dirty="0"/>
               <a:t>Preset</a:t>
             </a:r>
             <a:endParaRPr lang="nl-NL" dirty="0"/>
@@ -8749,7 +8690,7 @@
           <a:lstStyle/>
           <a:p>
             <a:r>
-              <a:rPr lang="en-US" sz="1200" dirty="0" smtClean="0"/>
+              <a:rPr lang="en-US" sz="1200" dirty="0"/>
               <a:t>U/D</a:t>
             </a:r>
             <a:endParaRPr lang="nl-NL" sz="1200" dirty="0"/>
@@ -8793,7 +8734,7 @@
           <a:p>
             <a:pPr algn="ctr"/>
             <a:r>
-              <a:rPr lang="en-US" dirty="0" smtClean="0"/>
+              <a:rPr lang="en-US" dirty="0"/>
               <a:t>Edit Name</a:t>
             </a:r>
             <a:endParaRPr lang="nl-NL" dirty="0"/>
@@ -8814,18 +8755,24 @@
           <a:prstGeom prst="rect">
             <a:avLst/>
           </a:prstGeom>
-        </p:spPr>
-        <p:style>
-          <a:lnRef idx="2">
-            <a:schemeClr val="accent1">
-              <a:shade val="50000"/>
+          <a:solidFill>
+            <a:schemeClr val="accent6">
+              <a:alpha val="50000"/>
             </a:schemeClr>
-          </a:lnRef>
-          <a:fillRef idx="1">
-            <a:schemeClr val="accent1"/>
+          </a:solidFill>
+          <a:ln>
+            <a:noFill/>
+          </a:ln>
+        </p:spPr>
+        <p:style>
+          <a:lnRef idx="0">
+            <a:scrgbClr r="0" g="0" b="0"/>
+          </a:lnRef>
+          <a:fillRef idx="0">
+            <a:scrgbClr r="0" g="0" b="0"/>
           </a:fillRef>
           <a:effectRef idx="0">
-            <a:schemeClr val="accent1"/>
+            <a:scrgbClr r="0" g="0" b="0"/>
           </a:effectRef>
           <a:fontRef idx="minor">
             <a:schemeClr val="lt1"/>
@@ -8837,7 +8784,7 @@
           <a:p>
             <a:pPr algn="ctr"/>
             <a:r>
-              <a:rPr lang="en-US" dirty="0" smtClean="0"/>
+              <a:rPr lang="en-US" dirty="0"/>
               <a:t>System</a:t>
             </a:r>
             <a:endParaRPr lang="nl-NL" dirty="0"/>
@@ -8903,7 +8850,7 @@
           <a:lstStyle/>
           <a:p>
             <a:r>
-              <a:rPr lang="en-US" sz="1200" dirty="0" smtClean="0"/>
+              <a:rPr lang="en-US" sz="1200" dirty="0"/>
               <a:t>X</a:t>
             </a:r>
             <a:endParaRPr lang="nl-NL" sz="1200" dirty="0"/>
@@ -8947,7 +8894,7 @@
           <a:p>
             <a:pPr algn="ctr"/>
             <a:r>
-              <a:rPr lang="en-US" dirty="0" smtClean="0"/>
+              <a:rPr lang="en-US" dirty="0"/>
               <a:t>Map Entry</a:t>
             </a:r>
             <a:endParaRPr lang="nl-NL" dirty="0"/>
@@ -9052,7 +8999,7 @@
           <a:lstStyle/>
           <a:p>
             <a:r>
-              <a:rPr lang="en-US" sz="1200" dirty="0" smtClean="0"/>
+              <a:rPr lang="en-US" sz="1200" dirty="0"/>
               <a:t>U/D</a:t>
             </a:r>
             <a:endParaRPr lang="nl-NL" sz="1200" dirty="0"/>
@@ -9096,11 +9043,11 @@
           <a:p>
             <a:pPr algn="ctr"/>
             <a:r>
-              <a:rPr lang="en-US" dirty="0" err="1" smtClean="0"/>
+              <a:rPr lang="en-US" dirty="0" err="1"/>
               <a:t>Msg</a:t>
             </a:r>
             <a:r>
-              <a:rPr lang="en-US" dirty="0" smtClean="0"/>
+              <a:rPr lang="en-US" dirty="0"/>
               <a:t> Type</a:t>
             </a:r>
             <a:endParaRPr lang="nl-NL" dirty="0"/>
@@ -9180,7 +9127,7 @@
           <a:p>
             <a:pPr algn="ctr"/>
             <a:r>
-              <a:rPr lang="en-US" dirty="0" smtClean="0"/>
+              <a:rPr lang="en-US" dirty="0"/>
               <a:t>Identifier</a:t>
             </a:r>
             <a:endParaRPr lang="nl-NL" dirty="0"/>
@@ -9259,7 +9206,7 @@
           <a:p>
             <a:pPr algn="ctr"/>
             <a:r>
-              <a:rPr lang="en-US" dirty="0" smtClean="0"/>
+              <a:rPr lang="en-US" dirty="0"/>
               <a:t>Value</a:t>
             </a:r>
             <a:endParaRPr lang="nl-NL" dirty="0"/>
@@ -9324,7 +9271,7 @@
           <a:lstStyle/>
           <a:p>
             <a:r>
-              <a:rPr lang="en-US" sz="1200" dirty="0" smtClean="0"/>
+              <a:rPr lang="en-US" sz="1200" dirty="0"/>
               <a:t>E</a:t>
             </a:r>
             <a:endParaRPr lang="nl-NL" sz="1200" dirty="0"/>
@@ -9368,7 +9315,7 @@
           <a:p>
             <a:pPr algn="ctr"/>
             <a:r>
-              <a:rPr lang="en-US" dirty="0" smtClean="0"/>
+              <a:rPr lang="en-US" dirty="0"/>
               <a:t>Messages</a:t>
             </a:r>
             <a:endParaRPr lang="nl-NL" dirty="0"/>
@@ -9473,7 +9420,7 @@
           <a:lstStyle/>
           <a:p>
             <a:r>
-              <a:rPr lang="en-US" sz="1200" dirty="0" smtClean="0"/>
+              <a:rPr lang="en-US" sz="1200" dirty="0"/>
               <a:t>U/D</a:t>
             </a:r>
             <a:endParaRPr lang="nl-NL" sz="1200" dirty="0"/>
@@ -9503,7 +9450,7 @@
           <a:lstStyle/>
           <a:p>
             <a:r>
-              <a:rPr lang="en-US" sz="1200" dirty="0" smtClean="0"/>
+              <a:rPr lang="en-US" sz="1200" dirty="0"/>
               <a:t>E</a:t>
             </a:r>
             <a:endParaRPr lang="nl-NL" sz="1200" dirty="0"/>
@@ -9524,18 +9471,24 @@
           <a:prstGeom prst="rect">
             <a:avLst/>
           </a:prstGeom>
-        </p:spPr>
-        <p:style>
-          <a:lnRef idx="2">
-            <a:schemeClr val="accent1">
-              <a:shade val="50000"/>
+          <a:solidFill>
+            <a:schemeClr val="accent3">
+              <a:alpha val="50000"/>
             </a:schemeClr>
-          </a:lnRef>
-          <a:fillRef idx="1">
-            <a:schemeClr val="accent1"/>
+          </a:solidFill>
+          <a:ln>
+            <a:noFill/>
+          </a:ln>
+        </p:spPr>
+        <p:style>
+          <a:lnRef idx="0">
+            <a:scrgbClr r="0" g="0" b="0"/>
+          </a:lnRef>
+          <a:fillRef idx="0">
+            <a:scrgbClr r="0" g="0" b="0"/>
           </a:fillRef>
           <a:effectRef idx="0">
-            <a:schemeClr val="accent1"/>
+            <a:scrgbClr r="0" g="0" b="0"/>
           </a:effectRef>
           <a:fontRef idx="minor">
             <a:schemeClr val="lt1"/>
@@ -9547,7 +9500,7 @@
           <a:p>
             <a:pPr algn="ctr"/>
             <a:r>
-              <a:rPr lang="en-US" dirty="0" smtClean="0"/>
+              <a:rPr lang="en-US" dirty="0"/>
               <a:t>Transform</a:t>
             </a:r>
             <a:endParaRPr lang="nl-NL" dirty="0"/>
@@ -9613,7 +9566,7 @@
           <a:lstStyle/>
           <a:p>
             <a:r>
-              <a:rPr lang="en-US" sz="1200" dirty="0" smtClean="0"/>
+              <a:rPr lang="en-US" sz="1200" dirty="0"/>
               <a:t>E</a:t>
             </a:r>
             <a:endParaRPr lang="nl-NL" sz="1200" dirty="0"/>
@@ -9643,7 +9596,7 @@
           <a:lstStyle/>
           <a:p>
             <a:r>
-              <a:rPr lang="en-US" sz="1200" dirty="0" smtClean="0"/>
+              <a:rPr lang="en-US" sz="1200" dirty="0"/>
               <a:t>64*</a:t>
             </a:r>
             <a:endParaRPr lang="nl-NL" sz="1200" dirty="0"/>
@@ -9673,7 +9626,7 @@
           <a:lstStyle/>
           <a:p>
             <a:r>
-              <a:rPr lang="en-US" sz="1200" dirty="0" smtClean="0"/>
+              <a:rPr lang="en-US" sz="1200" dirty="0"/>
               <a:t>24</a:t>
             </a:r>
             <a:endParaRPr lang="nl-NL" sz="1200" dirty="0"/>
@@ -9703,7 +9656,7 @@
           <a:lstStyle/>
           <a:p>
             <a:r>
-              <a:rPr lang="en-US" sz="1200" dirty="0" smtClean="0"/>
+              <a:rPr lang="en-US" sz="1200" dirty="0"/>
               <a:t>8</a:t>
             </a:r>
             <a:endParaRPr lang="nl-NL" sz="1200" dirty="0"/>
@@ -9747,11 +9700,11 @@
           <a:p>
             <a:pPr algn="ctr"/>
             <a:r>
-              <a:rPr lang="en-US" dirty="0" err="1" smtClean="0"/>
+              <a:rPr lang="en-US" dirty="0" err="1"/>
               <a:t>Msg</a:t>
             </a:r>
             <a:r>
-              <a:rPr lang="en-US" dirty="0" smtClean="0"/>
+              <a:rPr lang="en-US" dirty="0"/>
               <a:t> Type</a:t>
             </a:r>
             <a:endParaRPr lang="nl-NL" dirty="0"/>
@@ -9831,7 +9784,7 @@
           <a:p>
             <a:pPr algn="ctr"/>
             <a:r>
-              <a:rPr lang="en-US" dirty="0" smtClean="0"/>
+              <a:rPr lang="en-US" dirty="0"/>
               <a:t>Identifier</a:t>
             </a:r>
             <a:endParaRPr lang="nl-NL" dirty="0"/>
@@ -9910,7 +9863,7 @@
           <a:p>
             <a:pPr algn="ctr"/>
             <a:r>
-              <a:rPr lang="en-US" dirty="0" smtClean="0"/>
+              <a:rPr lang="en-US" dirty="0"/>
               <a:t>Value</a:t>
             </a:r>
             <a:endParaRPr lang="nl-NL" dirty="0"/>
@@ -9966,18 +9919,24 @@
           <a:prstGeom prst="rect">
             <a:avLst/>
           </a:prstGeom>
-        </p:spPr>
-        <p:style>
-          <a:lnRef idx="2">
-            <a:schemeClr val="accent1">
-              <a:shade val="50000"/>
+          <a:solidFill>
+            <a:schemeClr val="accent3">
+              <a:alpha val="50000"/>
             </a:schemeClr>
-          </a:lnRef>
-          <a:fillRef idx="1">
-            <a:schemeClr val="accent1"/>
+          </a:solidFill>
+          <a:ln>
+            <a:noFill/>
+          </a:ln>
+        </p:spPr>
+        <p:style>
+          <a:lnRef idx="0">
+            <a:scrgbClr r="0" g="0" b="0"/>
+          </a:lnRef>
+          <a:fillRef idx="0">
+            <a:scrgbClr r="0" g="0" b="0"/>
           </a:fillRef>
           <a:effectRef idx="0">
-            <a:schemeClr val="accent1"/>
+            <a:scrgbClr r="0" g="0" b="0"/>
           </a:effectRef>
           <a:fontRef idx="minor">
             <a:schemeClr val="lt1"/>
@@ -9989,7 +9948,7 @@
           <a:p>
             <a:pPr algn="ctr"/>
             <a:r>
-              <a:rPr lang="en-US" dirty="0" smtClean="0"/>
+              <a:rPr lang="en-US" dirty="0"/>
               <a:t>Transform</a:t>
             </a:r>
             <a:endParaRPr lang="nl-NL" dirty="0"/>
@@ -10055,7 +10014,7 @@
           <a:lstStyle/>
           <a:p>
             <a:r>
-              <a:rPr lang="en-US" sz="1200" dirty="0" smtClean="0"/>
+              <a:rPr lang="en-US" sz="1200" dirty="0"/>
               <a:t>E</a:t>
             </a:r>
             <a:endParaRPr lang="nl-NL" sz="1200" dirty="0"/>
@@ -10076,18 +10035,24 @@
           <a:prstGeom prst="rect">
             <a:avLst/>
           </a:prstGeom>
-        </p:spPr>
-        <p:style>
-          <a:lnRef idx="2">
-            <a:schemeClr val="accent1">
-              <a:shade val="50000"/>
+          <a:solidFill>
+            <a:schemeClr val="accent3">
+              <a:alpha val="50000"/>
             </a:schemeClr>
-          </a:lnRef>
-          <a:fillRef idx="1">
-            <a:schemeClr val="accent1"/>
+          </a:solidFill>
+          <a:ln>
+            <a:noFill/>
+          </a:ln>
+        </p:spPr>
+        <p:style>
+          <a:lnRef idx="0">
+            <a:scrgbClr r="0" g="0" b="0"/>
+          </a:lnRef>
+          <a:fillRef idx="0">
+            <a:scrgbClr r="0" g="0" b="0"/>
           </a:fillRef>
           <a:effectRef idx="0">
-            <a:schemeClr val="accent1"/>
+            <a:scrgbClr r="0" g="0" b="0"/>
           </a:effectRef>
           <a:fontRef idx="minor">
             <a:schemeClr val="lt1"/>
@@ -10099,7 +10064,7 @@
           <a:p>
             <a:pPr algn="ctr"/>
             <a:r>
-              <a:rPr lang="en-US" dirty="0" smtClean="0"/>
+              <a:rPr lang="en-US" dirty="0"/>
               <a:t>Transform</a:t>
             </a:r>
             <a:endParaRPr lang="nl-NL" dirty="0"/>
@@ -10165,7 +10130,7 @@
           <a:lstStyle/>
           <a:p>
             <a:r>
-              <a:rPr lang="en-US" sz="1200" dirty="0" smtClean="0"/>
+              <a:rPr lang="en-US" sz="1200" dirty="0"/>
               <a:t>E</a:t>
             </a:r>
             <a:endParaRPr lang="nl-NL" sz="1200" dirty="0"/>
@@ -10181,6 +10146,50 @@
         <p:spPr>
           <a:xfrm>
             <a:off x="173738" y="4953000"/>
+            <a:ext cx="1371600" cy="304800"/>
+          </a:xfrm>
+          <a:prstGeom prst="rect">
+            <a:avLst/>
+          </a:prstGeom>
+        </p:spPr>
+        <p:style>
+          <a:lnRef idx="2">
+            <a:schemeClr val="accent3">
+              <a:shade val="50000"/>
+            </a:schemeClr>
+          </a:lnRef>
+          <a:fillRef idx="1">
+            <a:schemeClr val="accent3"/>
+          </a:fillRef>
+          <a:effectRef idx="0">
+            <a:schemeClr val="accent3"/>
+          </a:effectRef>
+          <a:fontRef idx="minor">
+            <a:schemeClr val="lt1"/>
+          </a:fontRef>
+        </p:style>
+        <p:txBody>
+          <a:bodyPr rtlCol="0" anchor="ctr"/>
+          <a:lstStyle/>
+          <a:p>
+            <a:pPr algn="ctr"/>
+            <a:r>
+              <a:rPr lang="en-US" dirty="0"/>
+              <a:t>Transform</a:t>
+            </a:r>
+            <a:endParaRPr lang="nl-NL" dirty="0"/>
+          </a:p>
+        </p:txBody>
+      </p:sp>
+      <p:sp>
+        <p:nvSpPr>
+          <p:cNvPr id="92" name="Rectangle 91"/>
+          <p:cNvSpPr/>
+          <p:nvPr/>
+        </p:nvSpPr>
+        <p:spPr>
+          <a:xfrm>
+            <a:off x="2002538" y="4958589"/>
             <a:ext cx="1371600" cy="304800"/>
           </a:xfrm>
           <a:prstGeom prst="rect">
@@ -10209,51 +10218,7 @@
           <a:p>
             <a:pPr algn="ctr"/>
             <a:r>
-              <a:rPr lang="en-US" dirty="0" smtClean="0"/>
-              <a:t>Transform</a:t>
-            </a:r>
-            <a:endParaRPr lang="nl-NL" dirty="0"/>
-          </a:p>
-        </p:txBody>
-      </p:sp>
-      <p:sp>
-        <p:nvSpPr>
-          <p:cNvPr id="92" name="Rectangle 91"/>
-          <p:cNvSpPr/>
-          <p:nvPr/>
-        </p:nvSpPr>
-        <p:spPr>
-          <a:xfrm>
-            <a:off x="2002538" y="4958589"/>
-            <a:ext cx="1371600" cy="304800"/>
-          </a:xfrm>
-          <a:prstGeom prst="rect">
-            <a:avLst/>
-          </a:prstGeom>
-        </p:spPr>
-        <p:style>
-          <a:lnRef idx="2">
-            <a:schemeClr val="accent1">
-              <a:shade val="50000"/>
-            </a:schemeClr>
-          </a:lnRef>
-          <a:fillRef idx="1">
-            <a:schemeClr val="accent1"/>
-          </a:fillRef>
-          <a:effectRef idx="0">
-            <a:schemeClr val="accent1"/>
-          </a:effectRef>
-          <a:fontRef idx="minor">
-            <a:schemeClr val="lt1"/>
-          </a:fontRef>
-        </p:style>
-        <p:txBody>
-          <a:bodyPr rtlCol="0" anchor="ctr"/>
-          <a:lstStyle/>
-          <a:p>
-            <a:pPr algn="ctr"/>
-            <a:r>
-              <a:rPr lang="en-US" dirty="0" smtClean="0"/>
+              <a:rPr lang="en-US" dirty="0"/>
               <a:t> Type</a:t>
             </a:r>
             <a:endParaRPr lang="nl-NL" dirty="0"/>
@@ -10332,7 +10297,7 @@
           <a:p>
             <a:pPr algn="ctr"/>
             <a:r>
-              <a:rPr lang="en-US" dirty="0" smtClean="0"/>
+              <a:rPr lang="en-US" dirty="0"/>
               <a:t>Source</a:t>
             </a:r>
             <a:endParaRPr lang="nl-NL" dirty="0"/>
@@ -10411,7 +10376,7 @@
           <a:p>
             <a:pPr algn="ctr"/>
             <a:r>
-              <a:rPr lang="en-US" dirty="0" smtClean="0"/>
+              <a:rPr lang="en-US" dirty="0"/>
               <a:t>Target</a:t>
             </a:r>
             <a:endParaRPr lang="nl-NL" dirty="0"/>
@@ -10490,7 +10455,7 @@
           <a:p>
             <a:pPr algn="ctr"/>
             <a:r>
-              <a:rPr lang="en-US" dirty="0" smtClean="0"/>
+              <a:rPr lang="en-US" dirty="0"/>
               <a:t>Value</a:t>
             </a:r>
             <a:endParaRPr lang="nl-NL" dirty="0"/>
@@ -10570,7 +10535,7 @@
           <a:p>
             <a:pPr algn="ctr"/>
             <a:r>
-              <a:rPr lang="en-US" dirty="0" err="1" smtClean="0"/>
+              <a:rPr lang="en-US" dirty="0" err="1"/>
               <a:t>Realtime</a:t>
             </a:r>
             <a:endParaRPr lang="nl-NL" dirty="0"/>
@@ -10636,7 +10601,7 @@
           <a:lstStyle/>
           <a:p>
             <a:r>
-              <a:rPr lang="en-US" sz="1200" dirty="0" smtClean="0"/>
+              <a:rPr lang="en-US" sz="1200" dirty="0"/>
               <a:t>Timeout</a:t>
             </a:r>
             <a:endParaRPr lang="nl-NL" sz="1200" dirty="0"/>
@@ -10702,7 +10667,7 @@
           <a:lstStyle/>
           <a:p>
             <a:r>
-              <a:rPr lang="en-US" sz="1200" dirty="0" smtClean="0"/>
+              <a:rPr lang="en-US" sz="1200" dirty="0"/>
               <a:t>U/D</a:t>
             </a:r>
             <a:endParaRPr lang="nl-NL" sz="1200" dirty="0"/>
@@ -10768,7 +10733,7 @@
           <a:lstStyle/>
           <a:p>
             <a:r>
-              <a:rPr lang="en-US" sz="1200" dirty="0" smtClean="0"/>
+              <a:rPr lang="en-US" sz="1200" dirty="0"/>
               <a:t>U/D</a:t>
             </a:r>
             <a:endParaRPr lang="nl-NL" sz="1200" dirty="0"/>
@@ -10834,7 +10799,7 @@
           <a:lstStyle/>
           <a:p>
             <a:r>
-              <a:rPr lang="en-US" sz="1200" dirty="0" smtClean="0"/>
+              <a:rPr lang="en-US" sz="1200" dirty="0"/>
               <a:t>U/D</a:t>
             </a:r>
             <a:endParaRPr lang="nl-NL" sz="1200" dirty="0"/>
@@ -10900,7 +10865,7 @@
           <a:lstStyle/>
           <a:p>
             <a:r>
-              <a:rPr lang="en-US" sz="1200" dirty="0" smtClean="0"/>
+              <a:rPr lang="en-US" sz="1200" dirty="0"/>
               <a:t>U/D</a:t>
             </a:r>
             <a:endParaRPr lang="nl-NL" sz="1200" dirty="0"/>
@@ -10966,7 +10931,7 @@
           <a:lstStyle/>
           <a:p>
             <a:r>
-              <a:rPr lang="en-US" sz="1200" dirty="0" smtClean="0"/>
+              <a:rPr lang="en-US" sz="1200" dirty="0"/>
               <a:t>U/D</a:t>
             </a:r>
             <a:endParaRPr lang="nl-NL" sz="1200" dirty="0"/>
@@ -11032,7 +10997,7 @@
           <a:lstStyle/>
           <a:p>
             <a:r>
-              <a:rPr lang="en-US" sz="1200" dirty="0" smtClean="0"/>
+              <a:rPr lang="en-US" sz="1200" dirty="0"/>
               <a:t>U/D</a:t>
             </a:r>
             <a:endParaRPr lang="nl-NL" sz="1200" dirty="0"/>
@@ -11098,7 +11063,7 @@
           <a:lstStyle/>
           <a:p>
             <a:r>
-              <a:rPr lang="en-US" sz="1200" dirty="0" smtClean="0"/>
+              <a:rPr lang="en-US" sz="1200" dirty="0"/>
               <a:t>U/D</a:t>
             </a:r>
             <a:endParaRPr lang="nl-NL" sz="1200" dirty="0"/>
@@ -11164,7 +11129,7 @@
           <a:lstStyle/>
           <a:p>
             <a:r>
-              <a:rPr lang="en-US" sz="1200" dirty="0" smtClean="0"/>
+              <a:rPr lang="en-US" sz="1200" dirty="0"/>
               <a:t>U/D</a:t>
             </a:r>
             <a:endParaRPr lang="nl-NL" sz="1200" dirty="0"/>
@@ -11230,7 +11195,7 @@
           <a:lstStyle/>
           <a:p>
             <a:r>
-              <a:rPr lang="en-US" sz="1200" dirty="0" smtClean="0"/>
+              <a:rPr lang="en-US" sz="1200" dirty="0"/>
               <a:t>U/D</a:t>
             </a:r>
             <a:endParaRPr lang="nl-NL" sz="1200" dirty="0"/>
@@ -11296,7 +11261,7 @@
           <a:lstStyle/>
           <a:p>
             <a:r>
-              <a:rPr lang="en-US" sz="1200" dirty="0" smtClean="0"/>
+              <a:rPr lang="en-US" sz="1200" dirty="0"/>
               <a:t>U/D</a:t>
             </a:r>
             <a:endParaRPr lang="nl-NL" sz="1200" dirty="0"/>
@@ -11370,7 +11335,7 @@
           <a:p>
             <a:pPr algn="ctr"/>
             <a:r>
-              <a:rPr lang="en-US" dirty="0" smtClean="0"/>
+              <a:rPr lang="en-US" dirty="0"/>
               <a:t>MIDI Out</a:t>
             </a:r>
             <a:endParaRPr lang="nl-NL" dirty="0"/>
@@ -11475,7 +11440,7 @@
           <a:lstStyle/>
           <a:p>
             <a:r>
-              <a:rPr lang="en-US" sz="1200" dirty="0" smtClean="0"/>
+              <a:rPr lang="en-US" sz="1200" dirty="0"/>
               <a:t>U/D</a:t>
             </a:r>
             <a:endParaRPr lang="nl-NL" sz="1200" dirty="0"/>
@@ -11519,7 +11484,7 @@
           <a:p>
             <a:pPr algn="ctr"/>
             <a:r>
-              <a:rPr lang="en-US" dirty="0" smtClean="0"/>
+              <a:rPr lang="en-US" dirty="0"/>
               <a:t>Enable</a:t>
             </a:r>
             <a:endParaRPr lang="nl-NL" dirty="0"/>
@@ -11543,15 +11508,15 @@
         </p:spPr>
         <p:style>
           <a:lnRef idx="2">
-            <a:schemeClr val="accent1">
+            <a:schemeClr val="accent6">
               <a:shade val="50000"/>
             </a:schemeClr>
           </a:lnRef>
           <a:fillRef idx="1">
-            <a:schemeClr val="accent1"/>
+            <a:schemeClr val="accent6"/>
           </a:fillRef>
           <a:effectRef idx="0">
-            <a:schemeClr val="accent1"/>
+            <a:schemeClr val="accent6"/>
           </a:effectRef>
           <a:fontRef idx="minor">
             <a:schemeClr val="lt1"/>
@@ -11563,7 +11528,7 @@
           <a:p>
             <a:pPr algn="ctr"/>
             <a:r>
-              <a:rPr lang="en-US" dirty="0" smtClean="0"/>
+              <a:rPr lang="en-US" dirty="0"/>
               <a:t>System</a:t>
             </a:r>
             <a:endParaRPr lang="nl-NL" dirty="0"/>
@@ -11659,7 +11624,7 @@
           <a:lstStyle/>
           <a:p>
             <a:r>
-              <a:rPr lang="en-US" sz="1200" dirty="0" smtClean="0"/>
+              <a:rPr lang="en-US" sz="1200" dirty="0"/>
               <a:t>4</a:t>
             </a:r>
             <a:endParaRPr lang="nl-NL" sz="1200" dirty="0"/>
@@ -11739,7 +11704,7 @@
           <a:p>
             <a:pPr algn="ctr"/>
             <a:r>
-              <a:rPr lang="en-US" dirty="0" err="1" smtClean="0"/>
+              <a:rPr lang="en-US" dirty="0" err="1"/>
               <a:t>RcvSysEx</a:t>
             </a:r>
             <a:endParaRPr lang="nl-NL" dirty="0"/>
@@ -11819,7 +11784,7 @@
           <a:p>
             <a:pPr algn="ctr"/>
             <a:r>
-              <a:rPr lang="en-US" dirty="0" err="1" smtClean="0"/>
+              <a:rPr lang="en-US" dirty="0" err="1"/>
               <a:t>SysExId</a:t>
             </a:r>
             <a:endParaRPr lang="nl-NL" dirty="0"/>
@@ -11899,7 +11864,7 @@
           <a:p>
             <a:pPr algn="ctr"/>
             <a:r>
-              <a:rPr lang="en-US" dirty="0" err="1" smtClean="0"/>
+              <a:rPr lang="en-US" dirty="0" err="1"/>
               <a:t>SysExCh</a:t>
             </a:r>
             <a:endParaRPr lang="nl-NL" dirty="0"/>
@@ -11978,7 +11943,7 @@
           <a:p>
             <a:pPr algn="ctr"/>
             <a:r>
-              <a:rPr lang="en-US" dirty="0" smtClean="0"/>
+              <a:rPr lang="en-US" dirty="0"/>
               <a:t>Edit Name</a:t>
             </a:r>
             <a:endParaRPr lang="nl-NL" dirty="0"/>
@@ -12058,7 +12023,7 @@
           <a:p>
             <a:pPr algn="ctr"/>
             <a:r>
-              <a:rPr lang="en-US" dirty="0" err="1" smtClean="0"/>
+              <a:rPr lang="en-US" dirty="0" err="1"/>
               <a:t>RunStat</a:t>
             </a:r>
             <a:endParaRPr lang="nl-NL" dirty="0"/>
@@ -12138,7 +12103,7 @@
           <a:p>
             <a:pPr algn="ctr"/>
             <a:r>
-              <a:rPr lang="en-US" dirty="0" err="1" smtClean="0"/>
+              <a:rPr lang="en-US" dirty="0" err="1"/>
               <a:t>MinTime</a:t>
             </a:r>
             <a:endParaRPr lang="nl-NL" dirty="0"/>
@@ -12182,7 +12147,7 @@
           <a:p>
             <a:pPr algn="ctr"/>
             <a:r>
-              <a:rPr lang="en-US" dirty="0" smtClean="0"/>
+              <a:rPr lang="en-US" dirty="0"/>
               <a:t>Preset</a:t>
             </a:r>
             <a:endParaRPr lang="nl-NL" dirty="0"/>
@@ -12248,7 +12213,7 @@
           <a:lstStyle/>
           <a:p>
             <a:r>
-              <a:rPr lang="en-US" sz="1200" dirty="0" smtClean="0"/>
+              <a:rPr lang="en-US" sz="1200" dirty="0"/>
               <a:t>X</a:t>
             </a:r>
             <a:endParaRPr lang="nl-NL" sz="1200" dirty="0"/>
@@ -12322,7 +12287,7 @@
           <a:p>
             <a:pPr algn="ctr"/>
             <a:r>
-              <a:rPr lang="en-US" dirty="0" smtClean="0"/>
+              <a:rPr lang="en-US" dirty="0"/>
               <a:t>Splash</a:t>
             </a:r>
             <a:endParaRPr lang="nl-NL" dirty="0"/>
@@ -12366,7 +12331,7 @@
           <a:p>
             <a:pPr algn="ctr"/>
             <a:r>
-              <a:rPr lang="en-US" dirty="0" err="1" smtClean="0"/>
+              <a:rPr lang="en-US" dirty="0" err="1"/>
               <a:t>Realtime</a:t>
             </a:r>
             <a:endParaRPr lang="nl-NL" dirty="0"/>
@@ -12432,7 +12397,7 @@
           <a:lstStyle/>
           <a:p>
             <a:r>
-              <a:rPr lang="en-US" sz="1200" dirty="0" smtClean="0"/>
+              <a:rPr lang="en-US" sz="1200" dirty="0"/>
               <a:t>Startup</a:t>
             </a:r>
             <a:endParaRPr lang="nl-NL" sz="1200" dirty="0"/>
@@ -12476,7 +12441,7 @@
           <a:p>
             <a:pPr algn="ctr"/>
             <a:r>
-              <a:rPr lang="en-US" dirty="0" smtClean="0"/>
+              <a:rPr lang="en-US" dirty="0"/>
               <a:t>Settings</a:t>
             </a:r>
             <a:endParaRPr lang="nl-NL" dirty="0"/>
@@ -12520,7 +12485,7 @@
           <a:p>
             <a:pPr algn="ctr"/>
             <a:r>
-              <a:rPr lang="en-US" dirty="0" smtClean="0"/>
+              <a:rPr lang="en-US" dirty="0"/>
               <a:t>Preset</a:t>
             </a:r>
             <a:endParaRPr lang="nl-NL" dirty="0"/>
@@ -12712,7 +12677,7 @@
           <a:lstStyle/>
           <a:p>
             <a:r>
-              <a:rPr lang="en-US" sz="1200" dirty="0" smtClean="0"/>
+              <a:rPr lang="en-US" sz="1200" dirty="0"/>
               <a:t>X</a:t>
             </a:r>
             <a:endParaRPr lang="nl-NL" sz="1200" dirty="0"/>
@@ -12742,7 +12707,7 @@
           <a:lstStyle/>
           <a:p>
             <a:r>
-              <a:rPr lang="en-US" sz="1200" dirty="0" smtClean="0"/>
+              <a:rPr lang="en-US" sz="1200" dirty="0"/>
               <a:t>X</a:t>
             </a:r>
             <a:endParaRPr lang="nl-NL" sz="1200" dirty="0"/>
@@ -12772,7 +12737,7 @@
           <a:lstStyle/>
           <a:p>
             <a:r>
-              <a:rPr lang="en-US" sz="1200" dirty="0" smtClean="0"/>
+              <a:rPr lang="en-US" sz="1200" dirty="0"/>
               <a:t>Timeout</a:t>
             </a:r>
             <a:endParaRPr lang="nl-NL" sz="1200" dirty="0"/>
@@ -12851,7 +12816,7 @@
           <a:p>
             <a:pPr algn="ctr"/>
             <a:r>
-              <a:rPr lang="en-US" dirty="0" smtClean="0"/>
+              <a:rPr lang="en-US" dirty="0"/>
               <a:t>Mode</a:t>
             </a:r>
             <a:endParaRPr lang="nl-NL" dirty="0"/>
@@ -12917,7 +12882,7 @@
           <a:lstStyle/>
           <a:p>
             <a:r>
-              <a:rPr lang="en-US" sz="1200" dirty="0" smtClean="0"/>
+              <a:rPr lang="en-US" sz="1200" dirty="0"/>
               <a:t>U/D</a:t>
             </a:r>
             <a:endParaRPr lang="nl-NL" sz="1200" dirty="0"/>
@@ -12983,7 +12948,7 @@
           <a:lstStyle/>
           <a:p>
             <a:r>
-              <a:rPr lang="en-US" sz="1200" dirty="0" smtClean="0"/>
+              <a:rPr lang="en-US" sz="1200" dirty="0"/>
               <a:t>U/D</a:t>
             </a:r>
             <a:endParaRPr lang="nl-NL" sz="1200" dirty="0"/>

</xml_diff>